<commit_message>
Start analysis. Paper revamp
</commit_message>
<xml_diff>
--- a/multilevel picture.pptx
+++ b/multilevel picture.pptx
@@ -4,6 +4,9 @@
   <p:sldMasterIdLst>
     <p:sldMasterId id="2147483648" r:id="rId1"/>
   </p:sldMasterIdLst>
+  <p:notesMasterIdLst>
+    <p:notesMasterId r:id="rId3"/>
+  </p:notesMasterIdLst>
   <p:sldIdLst>
     <p:sldId id="256" r:id="rId2"/>
   </p:sldIdLst>
@@ -107,6 +110,356 @@
 </p:presentation>
 </file>
 
+<file path=ppt/notesMasters/notesMaster1.xml><?xml version="1.0" encoding="utf-8"?>
+<p:notesMaster xmlns:a="http://schemas.openxmlformats.org/drawingml/2006/main" xmlns:r="http://schemas.openxmlformats.org/officeDocument/2006/relationships" xmlns:p="http://schemas.openxmlformats.org/presentationml/2006/main">
+  <p:cSld>
+    <p:bg>
+      <p:bgRef idx="1001">
+        <a:schemeClr val="bg1"/>
+      </p:bgRef>
+    </p:bg>
+    <p:spTree>
+      <p:nvGrpSpPr>
+        <p:cNvPr id="1" name=""/>
+        <p:cNvGrpSpPr/>
+        <p:nvPr/>
+      </p:nvGrpSpPr>
+      <p:grpSpPr>
+        <a:xfrm>
+          <a:off x="0" y="0"/>
+          <a:ext cx="0" cy="0"/>
+          <a:chOff x="0" y="0"/>
+          <a:chExt cx="0" cy="0"/>
+        </a:xfrm>
+      </p:grpSpPr>
+      <p:sp>
+        <p:nvSpPr>
+          <p:cNvPr id="2" name="Header Placeholder 1"/>
+          <p:cNvSpPr>
+            <a:spLocks noGrp="1"/>
+          </p:cNvSpPr>
+          <p:nvPr>
+            <p:ph type="hdr" sz="quarter"/>
+          </p:nvPr>
+        </p:nvSpPr>
+        <p:spPr>
+          <a:xfrm>
+            <a:off x="0" y="0"/>
+            <a:ext cx="2971800" cy="457200"/>
+          </a:xfrm>
+          <a:prstGeom prst="rect">
+            <a:avLst/>
+          </a:prstGeom>
+        </p:spPr>
+        <p:txBody>
+          <a:bodyPr vert="horz" lIns="91440" tIns="45720" rIns="91440" bIns="45720" rtlCol="0"/>
+          <a:lstStyle>
+            <a:lvl1pPr algn="l">
+              <a:defRPr sz="1200"/>
+            </a:lvl1pPr>
+          </a:lstStyle>
+          <a:p>
+            <a:endParaRPr lang="en-CA"/>
+          </a:p>
+        </p:txBody>
+      </p:sp>
+      <p:sp>
+        <p:nvSpPr>
+          <p:cNvPr id="3" name="Date Placeholder 2"/>
+          <p:cNvSpPr>
+            <a:spLocks noGrp="1"/>
+          </p:cNvSpPr>
+          <p:nvPr>
+            <p:ph type="dt" idx="1"/>
+          </p:nvPr>
+        </p:nvSpPr>
+        <p:spPr>
+          <a:xfrm>
+            <a:off x="3884613" y="0"/>
+            <a:ext cx="2971800" cy="457200"/>
+          </a:xfrm>
+          <a:prstGeom prst="rect">
+            <a:avLst/>
+          </a:prstGeom>
+        </p:spPr>
+        <p:txBody>
+          <a:bodyPr vert="horz" lIns="91440" tIns="45720" rIns="91440" bIns="45720" rtlCol="0"/>
+          <a:lstStyle>
+            <a:lvl1pPr algn="r">
+              <a:defRPr sz="1200"/>
+            </a:lvl1pPr>
+          </a:lstStyle>
+          <a:p>
+            <a:fld id="{C35F77C7-8860-4FA4-9AA2-CEEA761E9EF6}" type="datetimeFigureOut">
+              <a:rPr lang="en-CA" smtClean="0"/>
+              <a:t>11/09/2012</a:t>
+            </a:fld>
+            <a:endParaRPr lang="en-CA"/>
+          </a:p>
+        </p:txBody>
+      </p:sp>
+      <p:sp>
+        <p:nvSpPr>
+          <p:cNvPr id="4" name="Slide Image Placeholder 3"/>
+          <p:cNvSpPr>
+            <a:spLocks noGrp="1" noRot="1" noChangeAspect="1"/>
+          </p:cNvSpPr>
+          <p:nvPr>
+            <p:ph type="sldImg" idx="2"/>
+          </p:nvPr>
+        </p:nvSpPr>
+        <p:spPr>
+          <a:xfrm>
+            <a:off x="1143000" y="685800"/>
+            <a:ext cx="4572000" cy="3429000"/>
+          </a:xfrm>
+          <a:prstGeom prst="rect">
+            <a:avLst/>
+          </a:prstGeom>
+          <a:noFill/>
+          <a:ln w="12700">
+            <a:solidFill>
+              <a:prstClr val="black"/>
+            </a:solidFill>
+          </a:ln>
+        </p:spPr>
+        <p:txBody>
+          <a:bodyPr vert="horz" lIns="91440" tIns="45720" rIns="91440" bIns="45720" rtlCol="0" anchor="ctr"/>
+          <a:lstStyle/>
+          <a:p>
+            <a:endParaRPr lang="en-CA"/>
+          </a:p>
+        </p:txBody>
+      </p:sp>
+      <p:sp>
+        <p:nvSpPr>
+          <p:cNvPr id="5" name="Notes Placeholder 4"/>
+          <p:cNvSpPr>
+            <a:spLocks noGrp="1"/>
+          </p:cNvSpPr>
+          <p:nvPr>
+            <p:ph type="body" sz="quarter" idx="3"/>
+          </p:nvPr>
+        </p:nvSpPr>
+        <p:spPr>
+          <a:xfrm>
+            <a:off x="685800" y="4343400"/>
+            <a:ext cx="5486400" cy="4114800"/>
+          </a:xfrm>
+          <a:prstGeom prst="rect">
+            <a:avLst/>
+          </a:prstGeom>
+        </p:spPr>
+        <p:txBody>
+          <a:bodyPr vert="horz" lIns="91440" tIns="45720" rIns="91440" bIns="45720" rtlCol="0"/>
+          <a:lstStyle/>
+          <a:p>
+            <a:pPr lvl="0"/>
+            <a:r>
+              <a:rPr lang="en-US" smtClean="0"/>
+              <a:t>Click to edit Master text styles</a:t>
+            </a:r>
+          </a:p>
+          <a:p>
+            <a:pPr lvl="1"/>
+            <a:r>
+              <a:rPr lang="en-US" smtClean="0"/>
+              <a:t>Second level</a:t>
+            </a:r>
+          </a:p>
+          <a:p>
+            <a:pPr lvl="2"/>
+            <a:r>
+              <a:rPr lang="en-US" smtClean="0"/>
+              <a:t>Third level</a:t>
+            </a:r>
+          </a:p>
+          <a:p>
+            <a:pPr lvl="3"/>
+            <a:r>
+              <a:rPr lang="en-US" smtClean="0"/>
+              <a:t>Fourth level</a:t>
+            </a:r>
+          </a:p>
+          <a:p>
+            <a:pPr lvl="4"/>
+            <a:r>
+              <a:rPr lang="en-US" smtClean="0"/>
+              <a:t>Fifth level</a:t>
+            </a:r>
+            <a:endParaRPr lang="en-CA"/>
+          </a:p>
+        </p:txBody>
+      </p:sp>
+      <p:sp>
+        <p:nvSpPr>
+          <p:cNvPr id="6" name="Footer Placeholder 5"/>
+          <p:cNvSpPr>
+            <a:spLocks noGrp="1"/>
+          </p:cNvSpPr>
+          <p:nvPr>
+            <p:ph type="ftr" sz="quarter" idx="4"/>
+          </p:nvPr>
+        </p:nvSpPr>
+        <p:spPr>
+          <a:xfrm>
+            <a:off x="0" y="8685213"/>
+            <a:ext cx="2971800" cy="457200"/>
+          </a:xfrm>
+          <a:prstGeom prst="rect">
+            <a:avLst/>
+          </a:prstGeom>
+        </p:spPr>
+        <p:txBody>
+          <a:bodyPr vert="horz" lIns="91440" tIns="45720" rIns="91440" bIns="45720" rtlCol="0" anchor="b"/>
+          <a:lstStyle>
+            <a:lvl1pPr algn="l">
+              <a:defRPr sz="1200"/>
+            </a:lvl1pPr>
+          </a:lstStyle>
+          <a:p>
+            <a:endParaRPr lang="en-CA"/>
+          </a:p>
+        </p:txBody>
+      </p:sp>
+      <p:sp>
+        <p:nvSpPr>
+          <p:cNvPr id="7" name="Slide Number Placeholder 6"/>
+          <p:cNvSpPr>
+            <a:spLocks noGrp="1"/>
+          </p:cNvSpPr>
+          <p:nvPr>
+            <p:ph type="sldNum" sz="quarter" idx="5"/>
+          </p:nvPr>
+        </p:nvSpPr>
+        <p:spPr>
+          <a:xfrm>
+            <a:off x="3884613" y="8685213"/>
+            <a:ext cx="2971800" cy="457200"/>
+          </a:xfrm>
+          <a:prstGeom prst="rect">
+            <a:avLst/>
+          </a:prstGeom>
+        </p:spPr>
+        <p:txBody>
+          <a:bodyPr vert="horz" lIns="91440" tIns="45720" rIns="91440" bIns="45720" rtlCol="0" anchor="b"/>
+          <a:lstStyle>
+            <a:lvl1pPr algn="r">
+              <a:defRPr sz="1200"/>
+            </a:lvl1pPr>
+          </a:lstStyle>
+          <a:p>
+            <a:fld id="{ADDF8A51-685F-4DBF-8D77-A04746A19756}" type="slidenum">
+              <a:rPr lang="en-CA" smtClean="0"/>
+              <a:t>‹#›</a:t>
+            </a:fld>
+            <a:endParaRPr lang="en-CA"/>
+          </a:p>
+        </p:txBody>
+      </p:sp>
+    </p:spTree>
+    <p:extLst>
+      <p:ext uri="{BB962C8B-B14F-4D97-AF65-F5344CB8AC3E}">
+        <p14:creationId xmlns:p14="http://schemas.microsoft.com/office/powerpoint/2010/main" val="982446578"/>
+      </p:ext>
+    </p:extLst>
+  </p:cSld>
+  <p:clrMap bg1="lt1" tx1="dk1" bg2="lt2" tx2="dk2" accent1="accent1" accent2="accent2" accent3="accent3" accent4="accent4" accent5="accent5" accent6="accent6" hlink="hlink" folHlink="folHlink"/>
+  <p:notesStyle>
+    <a:lvl1pPr marL="0" algn="l" defTabSz="914400" rtl="0" eaLnBrk="1" latinLnBrk="0" hangingPunct="1">
+      <a:defRPr sz="1200" kern="1200">
+        <a:solidFill>
+          <a:schemeClr val="tx1"/>
+        </a:solidFill>
+        <a:latin typeface="+mn-lt"/>
+        <a:ea typeface="+mn-ea"/>
+        <a:cs typeface="+mn-cs"/>
+      </a:defRPr>
+    </a:lvl1pPr>
+    <a:lvl2pPr marL="457200" algn="l" defTabSz="914400" rtl="0" eaLnBrk="1" latinLnBrk="0" hangingPunct="1">
+      <a:defRPr sz="1200" kern="1200">
+        <a:solidFill>
+          <a:schemeClr val="tx1"/>
+        </a:solidFill>
+        <a:latin typeface="+mn-lt"/>
+        <a:ea typeface="+mn-ea"/>
+        <a:cs typeface="+mn-cs"/>
+      </a:defRPr>
+    </a:lvl2pPr>
+    <a:lvl3pPr marL="914400" algn="l" defTabSz="914400" rtl="0" eaLnBrk="1" latinLnBrk="0" hangingPunct="1">
+      <a:defRPr sz="1200" kern="1200">
+        <a:solidFill>
+          <a:schemeClr val="tx1"/>
+        </a:solidFill>
+        <a:latin typeface="+mn-lt"/>
+        <a:ea typeface="+mn-ea"/>
+        <a:cs typeface="+mn-cs"/>
+      </a:defRPr>
+    </a:lvl3pPr>
+    <a:lvl4pPr marL="1371600" algn="l" defTabSz="914400" rtl="0" eaLnBrk="1" latinLnBrk="0" hangingPunct="1">
+      <a:defRPr sz="1200" kern="1200">
+        <a:solidFill>
+          <a:schemeClr val="tx1"/>
+        </a:solidFill>
+        <a:latin typeface="+mn-lt"/>
+        <a:ea typeface="+mn-ea"/>
+        <a:cs typeface="+mn-cs"/>
+      </a:defRPr>
+    </a:lvl4pPr>
+    <a:lvl5pPr marL="1828800" algn="l" defTabSz="914400" rtl="0" eaLnBrk="1" latinLnBrk="0" hangingPunct="1">
+      <a:defRPr sz="1200" kern="1200">
+        <a:solidFill>
+          <a:schemeClr val="tx1"/>
+        </a:solidFill>
+        <a:latin typeface="+mn-lt"/>
+        <a:ea typeface="+mn-ea"/>
+        <a:cs typeface="+mn-cs"/>
+      </a:defRPr>
+    </a:lvl5pPr>
+    <a:lvl6pPr marL="2286000" algn="l" defTabSz="914400" rtl="0" eaLnBrk="1" latinLnBrk="0" hangingPunct="1">
+      <a:defRPr sz="1200" kern="1200">
+        <a:solidFill>
+          <a:schemeClr val="tx1"/>
+        </a:solidFill>
+        <a:latin typeface="+mn-lt"/>
+        <a:ea typeface="+mn-ea"/>
+        <a:cs typeface="+mn-cs"/>
+      </a:defRPr>
+    </a:lvl6pPr>
+    <a:lvl7pPr marL="2743200" algn="l" defTabSz="914400" rtl="0" eaLnBrk="1" latinLnBrk="0" hangingPunct="1">
+      <a:defRPr sz="1200" kern="1200">
+        <a:solidFill>
+          <a:schemeClr val="tx1"/>
+        </a:solidFill>
+        <a:latin typeface="+mn-lt"/>
+        <a:ea typeface="+mn-ea"/>
+        <a:cs typeface="+mn-cs"/>
+      </a:defRPr>
+    </a:lvl7pPr>
+    <a:lvl8pPr marL="3200400" algn="l" defTabSz="914400" rtl="0" eaLnBrk="1" latinLnBrk="0" hangingPunct="1">
+      <a:defRPr sz="1200" kern="1200">
+        <a:solidFill>
+          <a:schemeClr val="tx1"/>
+        </a:solidFill>
+        <a:latin typeface="+mn-lt"/>
+        <a:ea typeface="+mn-ea"/>
+        <a:cs typeface="+mn-cs"/>
+      </a:defRPr>
+    </a:lvl8pPr>
+    <a:lvl9pPr marL="3657600" algn="l" defTabSz="914400" rtl="0" eaLnBrk="1" latinLnBrk="0" hangingPunct="1">
+      <a:defRPr sz="1200" kern="1200">
+        <a:solidFill>
+          <a:schemeClr val="tx1"/>
+        </a:solidFill>
+        <a:latin typeface="+mn-lt"/>
+        <a:ea typeface="+mn-ea"/>
+        <a:cs typeface="+mn-cs"/>
+      </a:defRPr>
+    </a:lvl9pPr>
+  </p:notesStyle>
+</p:notesMaster>
+</file>
+
 <file path=ppt/slideLayouts/slideLayout1.xml><?xml version="1.0" encoding="utf-8"?>
 <p:sldLayout xmlns:a="http://schemas.openxmlformats.org/drawingml/2006/main" xmlns:r="http://schemas.openxmlformats.org/officeDocument/2006/relationships" xmlns:p="http://schemas.openxmlformats.org/presentationml/2006/main" type="title" preserve="1">
   <p:cSld name="Title Slide">
@@ -288,7 +641,7 @@
           <a:p>
             <a:fld id="{F1EA1097-6DDB-4B79-B57F-E0432D345DD2}" type="datetimeFigureOut">
               <a:rPr lang="en-US" smtClean="0"/>
-              <a:t>7/29/2012</a:t>
+              <a:t>9/11/2012</a:t>
             </a:fld>
             <a:endParaRPr lang="en-US"/>
           </a:p>
@@ -458,7 +811,7 @@
           <a:p>
             <a:fld id="{F1EA1097-6DDB-4B79-B57F-E0432D345DD2}" type="datetimeFigureOut">
               <a:rPr lang="en-US" smtClean="0"/>
-              <a:t>7/29/2012</a:t>
+              <a:t>9/11/2012</a:t>
             </a:fld>
             <a:endParaRPr lang="en-US"/>
           </a:p>
@@ -638,7 +991,7 @@
           <a:p>
             <a:fld id="{F1EA1097-6DDB-4B79-B57F-E0432D345DD2}" type="datetimeFigureOut">
               <a:rPr lang="en-US" smtClean="0"/>
-              <a:t>7/29/2012</a:t>
+              <a:t>9/11/2012</a:t>
             </a:fld>
             <a:endParaRPr lang="en-US"/>
           </a:p>
@@ -808,7 +1161,7 @@
           <a:p>
             <a:fld id="{F1EA1097-6DDB-4B79-B57F-E0432D345DD2}" type="datetimeFigureOut">
               <a:rPr lang="en-US" smtClean="0"/>
-              <a:t>7/29/2012</a:t>
+              <a:t>9/11/2012</a:t>
             </a:fld>
             <a:endParaRPr lang="en-US"/>
           </a:p>
@@ -1054,7 +1407,7 @@
           <a:p>
             <a:fld id="{F1EA1097-6DDB-4B79-B57F-E0432D345DD2}" type="datetimeFigureOut">
               <a:rPr lang="en-US" smtClean="0"/>
-              <a:t>7/29/2012</a:t>
+              <a:t>9/11/2012</a:t>
             </a:fld>
             <a:endParaRPr lang="en-US"/>
           </a:p>
@@ -1342,7 +1695,7 @@
           <a:p>
             <a:fld id="{F1EA1097-6DDB-4B79-B57F-E0432D345DD2}" type="datetimeFigureOut">
               <a:rPr lang="en-US" smtClean="0"/>
-              <a:t>7/29/2012</a:t>
+              <a:t>9/11/2012</a:t>
             </a:fld>
             <a:endParaRPr lang="en-US"/>
           </a:p>
@@ -1764,7 +2117,7 @@
           <a:p>
             <a:fld id="{F1EA1097-6DDB-4B79-B57F-E0432D345DD2}" type="datetimeFigureOut">
               <a:rPr lang="en-US" smtClean="0"/>
-              <a:t>7/29/2012</a:t>
+              <a:t>9/11/2012</a:t>
             </a:fld>
             <a:endParaRPr lang="en-US"/>
           </a:p>
@@ -1882,7 +2235,7 @@
           <a:p>
             <a:fld id="{F1EA1097-6DDB-4B79-B57F-E0432D345DD2}" type="datetimeFigureOut">
               <a:rPr lang="en-US" smtClean="0"/>
-              <a:t>7/29/2012</a:t>
+              <a:t>9/11/2012</a:t>
             </a:fld>
             <a:endParaRPr lang="en-US"/>
           </a:p>
@@ -1977,7 +2330,7 @@
           <a:p>
             <a:fld id="{F1EA1097-6DDB-4B79-B57F-E0432D345DD2}" type="datetimeFigureOut">
               <a:rPr lang="en-US" smtClean="0"/>
-              <a:t>7/29/2012</a:t>
+              <a:t>9/11/2012</a:t>
             </a:fld>
             <a:endParaRPr lang="en-US"/>
           </a:p>
@@ -2254,7 +2607,7 @@
           <a:p>
             <a:fld id="{F1EA1097-6DDB-4B79-B57F-E0432D345DD2}" type="datetimeFigureOut">
               <a:rPr lang="en-US" smtClean="0"/>
-              <a:t>7/29/2012</a:t>
+              <a:t>9/11/2012</a:t>
             </a:fld>
             <a:endParaRPr lang="en-US"/>
           </a:p>
@@ -2507,7 +2860,7 @@
           <a:p>
             <a:fld id="{F1EA1097-6DDB-4B79-B57F-E0432D345DD2}" type="datetimeFigureOut">
               <a:rPr lang="en-US" smtClean="0"/>
-              <a:t>7/29/2012</a:t>
+              <a:t>9/11/2012</a:t>
             </a:fld>
             <a:endParaRPr lang="en-US"/>
           </a:p>
@@ -2720,7 +3073,7 @@
           <a:p>
             <a:fld id="{F1EA1097-6DDB-4B79-B57F-E0432D345DD2}" type="datetimeFigureOut">
               <a:rPr lang="en-US" smtClean="0"/>
-              <a:t>7/29/2012</a:t>
+              <a:t>9/11/2012</a:t>
             </a:fld>
             <a:endParaRPr lang="en-US"/>
           </a:p>
@@ -3097,439 +3450,424 @@
       </p:grpSpPr>
       <p:grpSp>
         <p:nvGrpSpPr>
-          <p:cNvPr id="51" name="Group 50"/>
+          <p:cNvPr id="53" name="Group 52"/>
           <p:cNvGrpSpPr/>
           <p:nvPr/>
         </p:nvGrpSpPr>
         <p:grpSpPr>
           <a:xfrm>
             <a:off x="890379" y="357982"/>
-            <a:ext cx="1949055" cy="2418288"/>
+            <a:ext cx="2248995" cy="2418288"/>
             <a:chOff x="890379" y="357982"/>
-            <a:chExt cx="1949055" cy="2418288"/>
+            <a:chExt cx="2248995" cy="2418288"/>
           </a:xfrm>
         </p:grpSpPr>
         <p:grpSp>
           <p:nvGrpSpPr>
-            <p:cNvPr id="49" name="Group 48"/>
+            <p:cNvPr id="46" name="Group 45"/>
             <p:cNvGrpSpPr/>
             <p:nvPr/>
           </p:nvGrpSpPr>
           <p:grpSpPr>
             <a:xfrm>
-              <a:off x="1371600" y="588815"/>
-              <a:ext cx="826033" cy="1967831"/>
-              <a:chOff x="1371600" y="588815"/>
-              <a:chExt cx="1524001" cy="4040335"/>
+              <a:off x="1371600" y="1638101"/>
+              <a:ext cx="826032" cy="408242"/>
+              <a:chOff x="1371600" y="2743200"/>
+              <a:chExt cx="1524000" cy="838200"/>
             </a:xfrm>
           </p:grpSpPr>
-          <p:grpSp>
-            <p:nvGrpSpPr>
-              <p:cNvPr id="46" name="Group 45"/>
-              <p:cNvGrpSpPr/>
+          <p:cxnSp>
+            <p:nvCxnSpPr>
+              <p:cNvPr id="9" name="Straight Connector 8"/>
+              <p:cNvCxnSpPr>
+                <a:stCxn id="4" idx="2"/>
+              </p:cNvCxnSpPr>
               <p:nvPr/>
-            </p:nvGrpSpPr>
-            <p:grpSpPr>
+            </p:nvCxnSpPr>
+            <p:spPr>
+              <a:xfrm flipH="1">
+                <a:off x="1371600" y="2743200"/>
+                <a:ext cx="714374" cy="838200"/>
+              </a:xfrm>
+              <a:prstGeom prst="line">
+                <a:avLst/>
+              </a:prstGeom>
+              <a:ln w="28575">
+                <a:solidFill>
+                  <a:schemeClr val="tx1"/>
+                </a:solidFill>
+                <a:prstDash val="dash"/>
+              </a:ln>
+            </p:spPr>
+            <p:style>
+              <a:lnRef idx="1">
+                <a:schemeClr val="accent1"/>
+              </a:lnRef>
+              <a:fillRef idx="0">
+                <a:schemeClr val="accent1"/>
+              </a:fillRef>
+              <a:effectRef idx="0">
+                <a:schemeClr val="accent1"/>
+              </a:effectRef>
+              <a:fontRef idx="minor">
+                <a:schemeClr val="tx1"/>
+              </a:fontRef>
+            </p:style>
+          </p:cxnSp>
+          <p:cxnSp>
+            <p:nvCxnSpPr>
+              <p:cNvPr id="11" name="Straight Connector 10"/>
+              <p:cNvCxnSpPr>
+                <a:stCxn id="4" idx="2"/>
+              </p:cNvCxnSpPr>
+              <p:nvPr/>
+            </p:nvCxnSpPr>
+            <p:spPr>
               <a:xfrm>
-                <a:off x="1371600" y="2743200"/>
-                <a:ext cx="1524000" cy="838200"/>
-                <a:chOff x="1371600" y="2743200"/>
-                <a:chExt cx="1524000" cy="838200"/>
+                <a:off x="2085974" y="2743200"/>
+                <a:ext cx="809626" cy="838200"/>
               </a:xfrm>
-            </p:grpSpPr>
-            <p:cxnSp>
-              <p:nvCxnSpPr>
-                <p:cNvPr id="9" name="Straight Connector 8"/>
-                <p:cNvCxnSpPr>
-                  <a:stCxn id="4" idx="2"/>
-                </p:cNvCxnSpPr>
-                <p:nvPr/>
-              </p:nvCxnSpPr>
-              <p:spPr>
-                <a:xfrm flipH="1">
-                  <a:off x="1371600" y="2743200"/>
-                  <a:ext cx="762000" cy="838200"/>
-                </a:xfrm>
-                <a:prstGeom prst="line">
-                  <a:avLst/>
-                </a:prstGeom>
-                <a:ln w="28575">
-                  <a:solidFill>
-                    <a:schemeClr val="tx1"/>
-                  </a:solidFill>
-                  <a:prstDash val="dash"/>
-                </a:ln>
-              </p:spPr>
-              <p:style>
-                <a:lnRef idx="1">
-                  <a:schemeClr val="accent1"/>
-                </a:lnRef>
-                <a:fillRef idx="0">
-                  <a:schemeClr val="accent1"/>
-                </a:fillRef>
-                <a:effectRef idx="0">
-                  <a:schemeClr val="accent1"/>
-                </a:effectRef>
-                <a:fontRef idx="minor">
+              <a:prstGeom prst="line">
+                <a:avLst/>
+              </a:prstGeom>
+              <a:ln w="28575">
+                <a:solidFill>
                   <a:schemeClr val="tx1"/>
-                </a:fontRef>
-              </p:style>
-            </p:cxnSp>
-            <p:cxnSp>
-              <p:nvCxnSpPr>
-                <p:cNvPr id="11" name="Straight Connector 10"/>
-                <p:cNvCxnSpPr>
-                  <a:stCxn id="4" idx="2"/>
-                </p:cNvCxnSpPr>
-                <p:nvPr/>
-              </p:nvCxnSpPr>
-              <p:spPr>
-                <a:xfrm>
-                  <a:off x="2133600" y="2743200"/>
-                  <a:ext cx="762000" cy="838200"/>
-                </a:xfrm>
-                <a:prstGeom prst="line">
-                  <a:avLst/>
-                </a:prstGeom>
-                <a:ln w="28575">
-                  <a:solidFill>
-                    <a:schemeClr val="tx1"/>
-                  </a:solidFill>
-                  <a:prstDash val="dash"/>
-                </a:ln>
-              </p:spPr>
-              <p:style>
-                <a:lnRef idx="1">
-                  <a:schemeClr val="accent1"/>
-                </a:lnRef>
-                <a:fillRef idx="0">
-                  <a:schemeClr val="accent1"/>
-                </a:fillRef>
-                <a:effectRef idx="0">
-                  <a:schemeClr val="accent1"/>
-                </a:effectRef>
-                <a:fontRef idx="minor">
-                  <a:schemeClr val="tx1"/>
-                </a:fontRef>
-              </p:style>
-            </p:cxnSp>
-          </p:grpSp>
-          <p:grpSp>
-            <p:nvGrpSpPr>
-              <p:cNvPr id="47" name="Group 46"/>
-              <p:cNvGrpSpPr/>
+                </a:solidFill>
+                <a:prstDash val="dash"/>
+              </a:ln>
+            </p:spPr>
+            <p:style>
+              <a:lnRef idx="1">
+                <a:schemeClr val="accent1"/>
+              </a:lnRef>
+              <a:fillRef idx="0">
+                <a:schemeClr val="accent1"/>
+              </a:fillRef>
+              <a:effectRef idx="0">
+                <a:schemeClr val="accent1"/>
+              </a:effectRef>
+              <a:fontRef idx="minor">
+                <a:schemeClr val="tx1"/>
+              </a:fontRef>
+            </p:style>
+          </p:cxnSp>
+        </p:grpSp>
+        <p:grpSp>
+          <p:nvGrpSpPr>
+            <p:cNvPr id="47" name="Group 46"/>
+            <p:cNvGrpSpPr/>
+            <p:nvPr/>
+          </p:nvGrpSpPr>
+          <p:grpSpPr>
+            <a:xfrm>
+              <a:off x="1526480" y="588815"/>
+              <a:ext cx="464643" cy="1049286"/>
+              <a:chOff x="1371600" y="588814"/>
+              <a:chExt cx="1523999" cy="2154384"/>
+            </a:xfrm>
+          </p:grpSpPr>
+          <p:sp>
+            <p:nvSpPr>
+              <p:cNvPr id="4" name="Rectangle 3"/>
+              <p:cNvSpPr/>
               <p:nvPr/>
-            </p:nvGrpSpPr>
-            <p:grpSpPr>
+            </p:nvSpPr>
+            <p:spPr>
               <a:xfrm>
-                <a:off x="1371600" y="588815"/>
-                <a:ext cx="1524001" cy="2154385"/>
-                <a:chOff x="1371600" y="588815"/>
-                <a:chExt cx="1524001" cy="2154385"/>
+                <a:off x="1371600" y="857248"/>
+                <a:ext cx="1523999" cy="1885950"/>
               </a:xfrm>
-            </p:grpSpPr>
-            <p:sp>
-              <p:nvSpPr>
-                <p:cNvPr id="4" name="Rectangle 3"/>
-                <p:cNvSpPr/>
-                <p:nvPr/>
-              </p:nvSpPr>
-              <p:spPr>
-                <a:xfrm>
-                  <a:off x="1371600" y="857250"/>
-                  <a:ext cx="1524000" cy="1885950"/>
-                </a:xfrm>
-                <a:prstGeom prst="rect">
-                  <a:avLst/>
-                </a:prstGeom>
-                <a:noFill/>
-              </p:spPr>
-              <p:style>
-                <a:lnRef idx="2">
-                  <a:schemeClr val="accent1">
-                    <a:shade val="50000"/>
-                  </a:schemeClr>
-                </a:lnRef>
-                <a:fillRef idx="1">
-                  <a:schemeClr val="accent1"/>
-                </a:fillRef>
-                <a:effectRef idx="0">
-                  <a:schemeClr val="accent1"/>
-                </a:effectRef>
-                <a:fontRef idx="minor">
-                  <a:schemeClr val="lt1"/>
-                </a:fontRef>
-              </p:style>
-              <p:txBody>
-                <a:bodyPr rtlCol="0" anchor="ctr"/>
-                <a:lstStyle/>
-                <a:p>
-                  <a:pPr algn="ctr"/>
-                  <a:endParaRPr lang="en-US"/>
-                </a:p>
-              </p:txBody>
-            </p:sp>
-            <p:cxnSp>
-              <p:nvCxnSpPr>
-                <p:cNvPr id="14" name="Straight Connector 13"/>
-                <p:cNvCxnSpPr>
-                  <a:stCxn id="4" idx="0"/>
-                  <a:endCxn id="4" idx="2"/>
-                </p:cNvCxnSpPr>
-                <p:nvPr/>
-              </p:nvCxnSpPr>
-              <p:spPr>
-                <a:xfrm>
-                  <a:off x="2133600" y="857250"/>
-                  <a:ext cx="0" cy="1885950"/>
-                </a:xfrm>
-                <a:prstGeom prst="line">
-                  <a:avLst/>
-                </a:prstGeom>
-                <a:ln w="28575">
-                  <a:solidFill>
-                    <a:srgbClr val="FF0000"/>
-                  </a:solidFill>
-                  <a:prstDash val="sysDash"/>
-                </a:ln>
-              </p:spPr>
-              <p:style>
-                <a:lnRef idx="1">
-                  <a:schemeClr val="accent1"/>
-                </a:lnRef>
-                <a:fillRef idx="0">
-                  <a:schemeClr val="accent1"/>
-                </a:fillRef>
-                <a:effectRef idx="0">
-                  <a:schemeClr val="accent1"/>
-                </a:effectRef>
-                <a:fontRef idx="minor">
-                  <a:schemeClr val="tx1"/>
-                </a:fontRef>
-              </p:style>
-            </p:cxnSp>
-            <p:sp>
-              <p:nvSpPr>
-                <p:cNvPr id="17" name="Right Brace 16"/>
-                <p:cNvSpPr/>
-                <p:nvPr/>
-              </p:nvSpPr>
-              <p:spPr>
-                <a:xfrm rot="16200000">
-                  <a:off x="2043547" y="-83129"/>
-                  <a:ext cx="180110" cy="1523998"/>
-                </a:xfrm>
-                <a:prstGeom prst="rightBrace">
-                  <a:avLst/>
-                </a:prstGeom>
-              </p:spPr>
-              <p:style>
-                <a:lnRef idx="1">
-                  <a:schemeClr val="accent1"/>
-                </a:lnRef>
-                <a:fillRef idx="0">
-                  <a:schemeClr val="accent1"/>
-                </a:fillRef>
-                <a:effectRef idx="0">
-                  <a:schemeClr val="accent1"/>
-                </a:effectRef>
-                <a:fontRef idx="minor">
-                  <a:schemeClr val="tx1"/>
-                </a:fontRef>
-              </p:style>
-              <p:txBody>
-                <a:bodyPr rtlCol="0" anchor="ctr"/>
-                <a:lstStyle/>
-                <a:p>
-                  <a:pPr algn="ctr"/>
-                  <a:endParaRPr lang="en-US"/>
-                </a:p>
-              </p:txBody>
-            </p:sp>
-          </p:grpSp>
-          <p:grpSp>
-            <p:nvGrpSpPr>
-              <p:cNvPr id="48" name="Group 47"/>
-              <p:cNvGrpSpPr/>
+              <a:prstGeom prst="rect">
+                <a:avLst/>
+              </a:prstGeom>
+              <a:noFill/>
+            </p:spPr>
+            <p:style>
+              <a:lnRef idx="2">
+                <a:schemeClr val="accent1">
+                  <a:shade val="50000"/>
+                </a:schemeClr>
+              </a:lnRef>
+              <a:fillRef idx="1">
+                <a:schemeClr val="accent1"/>
+              </a:fillRef>
+              <a:effectRef idx="0">
+                <a:schemeClr val="accent1"/>
+              </a:effectRef>
+              <a:fontRef idx="minor">
+                <a:schemeClr val="lt1"/>
+              </a:fontRef>
+            </p:style>
+            <p:txBody>
+              <a:bodyPr rtlCol="0" anchor="ctr"/>
+              <a:lstStyle/>
+              <a:p>
+                <a:pPr algn="ctr"/>
+                <a:endParaRPr lang="en-US"/>
+              </a:p>
+            </p:txBody>
+          </p:sp>
+          <p:cxnSp>
+            <p:nvCxnSpPr>
+              <p:cNvPr id="14" name="Straight Connector 13"/>
+              <p:cNvCxnSpPr>
+                <a:stCxn id="4" idx="0"/>
+                <a:endCxn id="4" idx="2"/>
+              </p:cNvCxnSpPr>
               <p:nvPr/>
-            </p:nvGrpSpPr>
-            <p:grpSpPr>
+            </p:nvCxnSpPr>
+            <p:spPr>
+              <a:xfrm>
+                <a:off x="2133600" y="857248"/>
+                <a:ext cx="0" cy="1885950"/>
+              </a:xfrm>
+              <a:prstGeom prst="line">
+                <a:avLst/>
+              </a:prstGeom>
+              <a:ln w="28575">
+                <a:solidFill>
+                  <a:srgbClr val="FF0000"/>
+                </a:solidFill>
+                <a:prstDash val="sysDash"/>
+              </a:ln>
+            </p:spPr>
+            <p:style>
+              <a:lnRef idx="1">
+                <a:schemeClr val="accent1"/>
+              </a:lnRef>
+              <a:fillRef idx="0">
+                <a:schemeClr val="accent1"/>
+              </a:fillRef>
+              <a:effectRef idx="0">
+                <a:schemeClr val="accent1"/>
+              </a:effectRef>
+              <a:fontRef idx="minor">
+                <a:schemeClr val="tx1"/>
+              </a:fontRef>
+            </p:style>
+          </p:cxnSp>
+          <p:sp>
+            <p:nvSpPr>
+              <p:cNvPr id="17" name="Right Brace 16"/>
+              <p:cNvSpPr/>
+              <p:nvPr/>
+            </p:nvSpPr>
+            <p:spPr>
+              <a:xfrm rot="16200000">
+                <a:off x="2043546" y="-83130"/>
+                <a:ext cx="180110" cy="1523997"/>
+              </a:xfrm>
+              <a:prstGeom prst="rightBrace">
+                <a:avLst/>
+              </a:prstGeom>
+            </p:spPr>
+            <p:style>
+              <a:lnRef idx="1">
+                <a:schemeClr val="accent1"/>
+              </a:lnRef>
+              <a:fillRef idx="0">
+                <a:schemeClr val="accent1"/>
+              </a:fillRef>
+              <a:effectRef idx="0">
+                <a:schemeClr val="accent1"/>
+              </a:effectRef>
+              <a:fontRef idx="minor">
+                <a:schemeClr val="tx1"/>
+              </a:fontRef>
+            </p:style>
+            <p:txBody>
+              <a:bodyPr rtlCol="0" anchor="ctr"/>
+              <a:lstStyle/>
+              <a:p>
+                <a:pPr algn="ctr"/>
+                <a:endParaRPr lang="en-US"/>
+              </a:p>
+            </p:txBody>
+          </p:sp>
+        </p:grpSp>
+        <p:grpSp>
+          <p:nvGrpSpPr>
+            <p:cNvPr id="48" name="Group 47"/>
+            <p:cNvGrpSpPr/>
+            <p:nvPr/>
+          </p:nvGrpSpPr>
+          <p:grpSpPr>
+            <a:xfrm>
+              <a:off x="1371600" y="2046343"/>
+              <a:ext cx="826032" cy="306182"/>
+              <a:chOff x="1371600" y="3581400"/>
+              <a:chExt cx="1524000" cy="628650"/>
+            </a:xfrm>
+          </p:grpSpPr>
+          <p:sp>
+            <p:nvSpPr>
+              <p:cNvPr id="7" name="Rectangle 6"/>
+              <p:cNvSpPr/>
+              <p:nvPr/>
+            </p:nvSpPr>
+            <p:spPr>
               <a:xfrm>
                 <a:off x="1371600" y="3581400"/>
                 <a:ext cx="1524000" cy="628650"/>
-                <a:chOff x="1371600" y="3581400"/>
-                <a:chExt cx="1524000" cy="628650"/>
               </a:xfrm>
-            </p:grpSpPr>
-            <p:sp>
-              <p:nvSpPr>
-                <p:cNvPr id="7" name="Rectangle 6"/>
-                <p:cNvSpPr/>
-                <p:nvPr/>
-              </p:nvSpPr>
-              <p:spPr>
-                <a:xfrm>
-                  <a:off x="1371600" y="3581400"/>
-                  <a:ext cx="1524000" cy="628650"/>
-                </a:xfrm>
-                <a:prstGeom prst="rect">
-                  <a:avLst/>
-                </a:prstGeom>
+              <a:prstGeom prst="rect">
+                <a:avLst/>
+              </a:prstGeom>
+              <a:solidFill>
+                <a:srgbClr val="7F7F7F">
+                  <a:alpha val="23137"/>
+                </a:srgbClr>
+              </a:solidFill>
+            </p:spPr>
+            <p:style>
+              <a:lnRef idx="2">
+                <a:schemeClr val="accent1">
+                  <a:shade val="50000"/>
+                </a:schemeClr>
+              </a:lnRef>
+              <a:fillRef idx="1">
+                <a:schemeClr val="accent1"/>
+              </a:fillRef>
+              <a:effectRef idx="0">
+                <a:schemeClr val="accent1"/>
+              </a:effectRef>
+              <a:fontRef idx="minor">
+                <a:schemeClr val="lt1"/>
+              </a:fontRef>
+            </p:style>
+            <p:txBody>
+              <a:bodyPr rtlCol="0" anchor="ctr"/>
+              <a:lstStyle/>
+              <a:p>
+                <a:pPr algn="ctr"/>
+                <a:endParaRPr lang="en-US" dirty="0"/>
+              </a:p>
+            </p:txBody>
+          </p:sp>
+          <p:cxnSp>
+            <p:nvCxnSpPr>
+              <p:cNvPr id="23" name="Straight Connector 22"/>
+              <p:cNvCxnSpPr/>
+              <p:nvPr/>
+            </p:nvCxnSpPr>
+            <p:spPr>
+              <a:xfrm>
+                <a:off x="1752600" y="3581400"/>
+                <a:ext cx="0" cy="628650"/>
+              </a:xfrm>
+              <a:prstGeom prst="line">
+                <a:avLst/>
+              </a:prstGeom>
+              <a:ln w="28575">
                 <a:solidFill>
-                  <a:srgbClr val="7F7F7F">
-                    <a:alpha val="23137"/>
-                  </a:srgbClr>
+                  <a:srgbClr val="FF0000"/>
                 </a:solidFill>
-              </p:spPr>
-              <p:style>
-                <a:lnRef idx="2">
-                  <a:schemeClr val="accent1">
-                    <a:shade val="50000"/>
-                  </a:schemeClr>
-                </a:lnRef>
-                <a:fillRef idx="1">
-                  <a:schemeClr val="accent1"/>
-                </a:fillRef>
-                <a:effectRef idx="0">
-                  <a:schemeClr val="accent1"/>
-                </a:effectRef>
-                <a:fontRef idx="minor">
-                  <a:schemeClr val="lt1"/>
-                </a:fontRef>
-              </p:style>
-              <p:txBody>
-                <a:bodyPr rtlCol="0" anchor="ctr"/>
-                <a:lstStyle/>
-                <a:p>
-                  <a:pPr algn="ctr"/>
-                  <a:endParaRPr lang="en-US" dirty="0"/>
-                </a:p>
-              </p:txBody>
-            </p:sp>
-            <p:cxnSp>
-              <p:nvCxnSpPr>
-                <p:cNvPr id="23" name="Straight Connector 22"/>
-                <p:cNvCxnSpPr/>
-                <p:nvPr/>
-              </p:nvCxnSpPr>
-              <p:spPr>
-                <a:xfrm>
-                  <a:off x="1752600" y="3581400"/>
-                  <a:ext cx="0" cy="628650"/>
-                </a:xfrm>
-                <a:prstGeom prst="line">
-                  <a:avLst/>
-                </a:prstGeom>
-                <a:ln w="28575">
-                  <a:solidFill>
-                    <a:srgbClr val="FF0000"/>
-                  </a:solidFill>
-                  <a:prstDash val="sysDash"/>
-                </a:ln>
-              </p:spPr>
-              <p:style>
-                <a:lnRef idx="1">
-                  <a:schemeClr val="accent1"/>
-                </a:lnRef>
-                <a:fillRef idx="0">
-                  <a:schemeClr val="accent1"/>
-                </a:fillRef>
-                <a:effectRef idx="0">
-                  <a:schemeClr val="accent1"/>
-                </a:effectRef>
-                <a:fontRef idx="minor">
+                <a:prstDash val="sysDash"/>
+              </a:ln>
+            </p:spPr>
+            <p:style>
+              <a:lnRef idx="1">
+                <a:schemeClr val="accent1"/>
+              </a:lnRef>
+              <a:fillRef idx="0">
+                <a:schemeClr val="accent1"/>
+              </a:fillRef>
+              <a:effectRef idx="0">
+                <a:schemeClr val="accent1"/>
+              </a:effectRef>
+              <a:fontRef idx="minor">
+                <a:schemeClr val="tx1"/>
+              </a:fontRef>
+            </p:style>
+          </p:cxnSp>
+        </p:grpSp>
+        <p:grpSp>
+          <p:nvGrpSpPr>
+            <p:cNvPr id="29" name="Group 28"/>
+            <p:cNvGrpSpPr/>
+            <p:nvPr/>
+          </p:nvGrpSpPr>
+          <p:grpSpPr>
+            <a:xfrm>
+              <a:off x="1371600" y="2352525"/>
+              <a:ext cx="413016" cy="204121"/>
+              <a:chOff x="990600" y="4210050"/>
+              <a:chExt cx="1524000" cy="838200"/>
+            </a:xfrm>
+          </p:grpSpPr>
+          <p:cxnSp>
+            <p:nvCxnSpPr>
+              <p:cNvPr id="25" name="Straight Connector 24"/>
+              <p:cNvCxnSpPr/>
+              <p:nvPr/>
+            </p:nvCxnSpPr>
+            <p:spPr>
+              <a:xfrm flipH="1">
+                <a:off x="990600" y="4210050"/>
+                <a:ext cx="762000" cy="838200"/>
+              </a:xfrm>
+              <a:prstGeom prst="line">
+                <a:avLst/>
+              </a:prstGeom>
+              <a:ln w="28575">
+                <a:solidFill>
                   <a:schemeClr val="tx1"/>
-                </a:fontRef>
-              </p:style>
-            </p:cxnSp>
-          </p:grpSp>
-          <p:grpSp>
-            <p:nvGrpSpPr>
-              <p:cNvPr id="29" name="Group 28"/>
-              <p:cNvGrpSpPr/>
+                </a:solidFill>
+                <a:prstDash val="dash"/>
+              </a:ln>
+            </p:spPr>
+            <p:style>
+              <a:lnRef idx="1">
+                <a:schemeClr val="accent1"/>
+              </a:lnRef>
+              <a:fillRef idx="0">
+                <a:schemeClr val="accent1"/>
+              </a:fillRef>
+              <a:effectRef idx="0">
+                <a:schemeClr val="accent1"/>
+              </a:effectRef>
+              <a:fontRef idx="minor">
+                <a:schemeClr val="tx1"/>
+              </a:fontRef>
+            </p:style>
+          </p:cxnSp>
+          <p:cxnSp>
+            <p:nvCxnSpPr>
+              <p:cNvPr id="26" name="Straight Connector 25"/>
+              <p:cNvCxnSpPr/>
               <p:nvPr/>
-            </p:nvGrpSpPr>
-            <p:grpSpPr>
+            </p:nvCxnSpPr>
+            <p:spPr>
               <a:xfrm>
-                <a:off x="1371600" y="4210050"/>
-                <a:ext cx="762000" cy="419100"/>
-                <a:chOff x="990600" y="4210050"/>
-                <a:chExt cx="1524000" cy="838200"/>
+                <a:off x="1752600" y="4210050"/>
+                <a:ext cx="762000" cy="838200"/>
               </a:xfrm>
-            </p:grpSpPr>
-            <p:cxnSp>
-              <p:nvCxnSpPr>
-                <p:cNvPr id="25" name="Straight Connector 24"/>
-                <p:cNvCxnSpPr/>
-                <p:nvPr/>
-              </p:nvCxnSpPr>
-              <p:spPr>
-                <a:xfrm flipH="1">
-                  <a:off x="990600" y="4210050"/>
-                  <a:ext cx="762000" cy="838200"/>
-                </a:xfrm>
-                <a:prstGeom prst="line">
-                  <a:avLst/>
-                </a:prstGeom>
-                <a:ln w="28575">
-                  <a:solidFill>
-                    <a:schemeClr val="tx1"/>
-                  </a:solidFill>
-                  <a:prstDash val="dash"/>
-                </a:ln>
-              </p:spPr>
-              <p:style>
-                <a:lnRef idx="1">
-                  <a:schemeClr val="accent1"/>
-                </a:lnRef>
-                <a:fillRef idx="0">
-                  <a:schemeClr val="accent1"/>
-                </a:fillRef>
-                <a:effectRef idx="0">
-                  <a:schemeClr val="accent1"/>
-                </a:effectRef>
-                <a:fontRef idx="minor">
+              <a:prstGeom prst="line">
+                <a:avLst/>
+              </a:prstGeom>
+              <a:ln w="28575">
+                <a:solidFill>
                   <a:schemeClr val="tx1"/>
-                </a:fontRef>
-              </p:style>
-            </p:cxnSp>
-            <p:cxnSp>
-              <p:nvCxnSpPr>
-                <p:cNvPr id="26" name="Straight Connector 25"/>
-                <p:cNvCxnSpPr/>
-                <p:nvPr/>
-              </p:nvCxnSpPr>
-              <p:spPr>
-                <a:xfrm>
-                  <a:off x="1752600" y="4210050"/>
-                  <a:ext cx="762000" cy="838200"/>
-                </a:xfrm>
-                <a:prstGeom prst="line">
-                  <a:avLst/>
-                </a:prstGeom>
-                <a:ln w="28575">
-                  <a:solidFill>
-                    <a:schemeClr val="tx1"/>
-                  </a:solidFill>
-                  <a:prstDash val="dash"/>
-                </a:ln>
-              </p:spPr>
-              <p:style>
-                <a:lnRef idx="1">
-                  <a:schemeClr val="accent1"/>
-                </a:lnRef>
-                <a:fillRef idx="0">
-                  <a:schemeClr val="accent1"/>
-                </a:fillRef>
-                <a:effectRef idx="0">
-                  <a:schemeClr val="accent1"/>
-                </a:effectRef>
-                <a:fontRef idx="minor">
-                  <a:schemeClr val="tx1"/>
-                </a:fontRef>
-              </p:style>
-            </p:cxnSp>
-          </p:grpSp>
+                </a:solidFill>
+                <a:prstDash val="dash"/>
+              </a:ln>
+            </p:spPr>
+            <p:style>
+              <a:lnRef idx="1">
+                <a:schemeClr val="accent1"/>
+              </a:lnRef>
+              <a:fillRef idx="0">
+                <a:schemeClr val="accent1"/>
+              </a:fillRef>
+              <a:effectRef idx="0">
+                <a:schemeClr val="accent1"/>
+              </a:effectRef>
+              <a:fontRef idx="minor">
+                <a:schemeClr val="tx1"/>
+              </a:fontRef>
+            </p:style>
+          </p:cxnSp>
         </p:grpSp>
         <p:sp>
           <p:nvSpPr>
@@ -3573,7 +3911,7 @@
           </p:nvSpPr>
           <p:spPr>
             <a:xfrm rot="5400000">
-              <a:off x="1670881" y="1076686"/>
+              <a:off x="1554373" y="1062309"/>
               <a:ext cx="564578" cy="230832"/>
             </a:xfrm>
             <a:prstGeom prst="rect">
@@ -3752,7 +4090,7 @@
           </p:nvSpPr>
           <p:spPr>
             <a:xfrm>
-              <a:off x="2261198" y="994162"/>
+              <a:off x="2393496" y="895436"/>
               <a:ext cx="505267" cy="369332"/>
             </a:xfrm>
             <a:prstGeom prst="rect">
@@ -3775,6 +4113,224 @@
               <a:r>
                 <a:rPr lang="en-US" sz="900" dirty="0" smtClean="0"/>
                 <a:t>p &lt;&lt; m</a:t>
+              </a:r>
+            </a:p>
+          </p:txBody>
+        </p:sp>
+        <p:sp>
+          <p:nvSpPr>
+            <p:cNvPr id="2" name="Rectangle 1"/>
+            <p:cNvSpPr/>
+            <p:nvPr/>
+          </p:nvSpPr>
+          <p:spPr>
+            <a:xfrm>
+              <a:off x="1991125" y="898311"/>
+              <a:ext cx="396620" cy="739790"/>
+            </a:xfrm>
+            <a:prstGeom prst="rect">
+              <a:avLst/>
+            </a:prstGeom>
+            <a:noFill/>
+          </p:spPr>
+          <p:style>
+            <a:lnRef idx="2">
+              <a:schemeClr val="accent1">
+                <a:shade val="50000"/>
+              </a:schemeClr>
+            </a:lnRef>
+            <a:fillRef idx="1">
+              <a:schemeClr val="accent1"/>
+            </a:fillRef>
+            <a:effectRef idx="0">
+              <a:schemeClr val="accent1"/>
+            </a:effectRef>
+            <a:fontRef idx="minor">
+              <a:schemeClr val="lt1"/>
+            </a:fontRef>
+          </p:style>
+          <p:txBody>
+            <a:bodyPr rtlCol="0" anchor="ctr"/>
+            <a:lstStyle/>
+            <a:p>
+              <a:pPr algn="ctr"/>
+              <a:endParaRPr lang="en-CA"/>
+            </a:p>
+          </p:txBody>
+        </p:sp>
+        <p:sp>
+          <p:nvSpPr>
+            <p:cNvPr id="3" name="Rectangle 2"/>
+            <p:cNvSpPr/>
+            <p:nvPr/>
+          </p:nvSpPr>
+          <p:spPr>
+            <a:xfrm>
+              <a:off x="1154654" y="1192102"/>
+              <a:ext cx="371826" cy="445999"/>
+            </a:xfrm>
+            <a:prstGeom prst="rect">
+              <a:avLst/>
+            </a:prstGeom>
+            <a:noFill/>
+          </p:spPr>
+          <p:style>
+            <a:lnRef idx="2">
+              <a:schemeClr val="accent1">
+                <a:shade val="50000"/>
+              </a:schemeClr>
+            </a:lnRef>
+            <a:fillRef idx="1">
+              <a:schemeClr val="accent1"/>
+            </a:fillRef>
+            <a:effectRef idx="0">
+              <a:schemeClr val="accent1"/>
+            </a:effectRef>
+            <a:fontRef idx="minor">
+              <a:schemeClr val="lt1"/>
+            </a:fontRef>
+          </p:style>
+          <p:txBody>
+            <a:bodyPr rtlCol="0" anchor="ctr"/>
+            <a:lstStyle/>
+            <a:p>
+              <a:pPr algn="ctr"/>
+              <a:endParaRPr lang="en-CA"/>
+            </a:p>
+          </p:txBody>
+        </p:sp>
+        <p:cxnSp>
+          <p:nvCxnSpPr>
+            <p:cNvPr id="19" name="Curved Connector 18"/>
+            <p:cNvCxnSpPr/>
+            <p:nvPr/>
+          </p:nvCxnSpPr>
+          <p:spPr>
+            <a:xfrm rot="10800000" flipV="1">
+              <a:off x="1758803" y="1380415"/>
+              <a:ext cx="887329" cy="178088"/>
+            </a:xfrm>
+            <a:prstGeom prst="curvedConnector4">
+              <a:avLst>
+                <a:gd name="adj1" fmla="val 68991"/>
+                <a:gd name="adj2" fmla="val 701"/>
+              </a:avLst>
+            </a:prstGeom>
+            <a:ln>
+              <a:tailEnd type="arrow"/>
+            </a:ln>
+          </p:spPr>
+          <p:style>
+            <a:lnRef idx="1">
+              <a:schemeClr val="dk1"/>
+            </a:lnRef>
+            <a:fillRef idx="0">
+              <a:schemeClr val="dk1"/>
+            </a:fillRef>
+            <a:effectRef idx="0">
+              <a:schemeClr val="dk1"/>
+            </a:effectRef>
+            <a:fontRef idx="minor">
+              <a:schemeClr val="tx1"/>
+            </a:fontRef>
+          </p:style>
+        </p:cxnSp>
+        <p:sp>
+          <p:nvSpPr>
+            <p:cNvPr id="40" name="TextBox 39"/>
+            <p:cNvSpPr txBox="1"/>
+            <p:nvPr/>
+          </p:nvSpPr>
+          <p:spPr>
+            <a:xfrm>
+              <a:off x="2658152" y="1268206"/>
+              <a:ext cx="481222" cy="230832"/>
+            </a:xfrm>
+            <a:prstGeom prst="rect">
+              <a:avLst/>
+            </a:prstGeom>
+            <a:noFill/>
+          </p:spPr>
+          <p:txBody>
+            <a:bodyPr wrap="none" rtlCol="0">
+              <a:spAutoFit/>
+            </a:bodyPr>
+            <a:lstStyle/>
+            <a:p>
+              <a:r>
+                <a:rPr lang="en-CA" sz="900" dirty="0" smtClean="0"/>
+                <a:t>Pixel x</a:t>
+              </a:r>
+              <a:endParaRPr lang="en-CA" sz="900" dirty="0"/>
+            </a:p>
+          </p:txBody>
+        </p:sp>
+        <p:cxnSp>
+          <p:nvCxnSpPr>
+            <p:cNvPr id="42" name="Curved Connector 41"/>
+            <p:cNvCxnSpPr/>
+            <p:nvPr/>
+          </p:nvCxnSpPr>
+          <p:spPr>
+            <a:xfrm>
+              <a:off x="2104012" y="2278871"/>
+              <a:ext cx="471993" cy="229575"/>
+            </a:xfrm>
+            <a:prstGeom prst="curvedConnector3">
+              <a:avLst>
+                <a:gd name="adj1" fmla="val 50000"/>
+              </a:avLst>
+            </a:prstGeom>
+            <a:ln>
+              <a:tailEnd type="arrow"/>
+            </a:ln>
+          </p:spPr>
+          <p:style>
+            <a:lnRef idx="1">
+              <a:schemeClr val="dk1"/>
+            </a:lnRef>
+            <a:fillRef idx="0">
+              <a:schemeClr val="dk1"/>
+            </a:fillRef>
+            <a:effectRef idx="0">
+              <a:schemeClr val="dk1"/>
+            </a:effectRef>
+            <a:fontRef idx="minor">
+              <a:schemeClr val="tx1"/>
+            </a:fontRef>
+          </p:style>
+        </p:cxnSp>
+        <p:sp>
+          <p:nvSpPr>
+            <p:cNvPr id="52" name="TextBox 51"/>
+            <p:cNvSpPr txBox="1"/>
+            <p:nvPr/>
+          </p:nvSpPr>
+          <p:spPr>
+            <a:xfrm>
+              <a:off x="2514600" y="2343937"/>
+              <a:ext cx="498855" cy="369332"/>
+            </a:xfrm>
+            <a:prstGeom prst="rect">
+              <a:avLst/>
+            </a:prstGeom>
+            <a:noFill/>
+          </p:spPr>
+          <p:txBody>
+            <a:bodyPr wrap="none" rtlCol="0">
+              <a:spAutoFit/>
+            </a:bodyPr>
+            <a:lstStyle/>
+            <a:p>
+              <a:r>
+                <a:rPr lang="en-CA" sz="900" dirty="0" smtClean="0"/>
+                <a:t>Slider </a:t>
+              </a:r>
+            </a:p>
+            <a:p>
+              <a:r>
+                <a:rPr lang="en-CA" sz="900" dirty="0" smtClean="0"/>
+                <a:t>thumb</a:t>
               </a:r>
             </a:p>
           </p:txBody>
@@ -4083,4 +4639,289 @@
   <a:objectDefaults/>
   <a:extraClrSchemeLst/>
 </a:theme>
+</file>
+
+<file path=ppt/theme/theme2.xml><?xml version="1.0" encoding="utf-8"?>
+<a:theme xmlns:a="http://schemas.openxmlformats.org/drawingml/2006/main" name="Office Theme">
+  <a:themeElements>
+    <a:clrScheme name="Office">
+      <a:dk1>
+        <a:sysClr val="windowText" lastClr="000000"/>
+      </a:dk1>
+      <a:lt1>
+        <a:sysClr val="window" lastClr="FFFFFF"/>
+      </a:lt1>
+      <a:dk2>
+        <a:srgbClr val="1F497D"/>
+      </a:dk2>
+      <a:lt2>
+        <a:srgbClr val="EEECE1"/>
+      </a:lt2>
+      <a:accent1>
+        <a:srgbClr val="4F81BD"/>
+      </a:accent1>
+      <a:accent2>
+        <a:srgbClr val="C0504D"/>
+      </a:accent2>
+      <a:accent3>
+        <a:srgbClr val="9BBB59"/>
+      </a:accent3>
+      <a:accent4>
+        <a:srgbClr val="8064A2"/>
+      </a:accent4>
+      <a:accent5>
+        <a:srgbClr val="4BACC6"/>
+      </a:accent5>
+      <a:accent6>
+        <a:srgbClr val="F79646"/>
+      </a:accent6>
+      <a:hlink>
+        <a:srgbClr val="0000FF"/>
+      </a:hlink>
+      <a:folHlink>
+        <a:srgbClr val="800080"/>
+      </a:folHlink>
+    </a:clrScheme>
+    <a:fontScheme name="Office">
+      <a:majorFont>
+        <a:latin typeface="Calibri"/>
+        <a:ea typeface=""/>
+        <a:cs typeface=""/>
+        <a:font script="Jpan" typeface="ＭＳ Ｐゴシック"/>
+        <a:font script="Hang" typeface="맑은 고딕"/>
+        <a:font script="Hans" typeface="宋体"/>
+        <a:font script="Hant" typeface="新細明體"/>
+        <a:font script="Arab" typeface="Times New Roman"/>
+        <a:font script="Hebr" typeface="Times New Roman"/>
+        <a:font script="Thai" typeface="Angsana New"/>
+        <a:font script="Ethi" typeface="Nyala"/>
+        <a:font script="Beng" typeface="Vrinda"/>
+        <a:font script="Gujr" typeface="Shruti"/>
+        <a:font script="Khmr" typeface="MoolBoran"/>
+        <a:font script="Knda" typeface="Tunga"/>
+        <a:font script="Guru" typeface="Raavi"/>
+        <a:font script="Cans" typeface="Euphemia"/>
+        <a:font script="Cher" typeface="Plantagenet Cherokee"/>
+        <a:font script="Yiii" typeface="Microsoft Yi Baiti"/>
+        <a:font script="Tibt" typeface="Microsoft Himalaya"/>
+        <a:font script="Thaa" typeface="MV Boli"/>
+        <a:font script="Deva" typeface="Mangal"/>
+        <a:font script="Telu" typeface="Gautami"/>
+        <a:font script="Taml" typeface="Latha"/>
+        <a:font script="Syrc" typeface="Estrangelo Edessa"/>
+        <a:font script="Orya" typeface="Kalinga"/>
+        <a:font script="Mlym" typeface="Kartika"/>
+        <a:font script="Laoo" typeface="DokChampa"/>
+        <a:font script="Sinh" typeface="Iskoola Pota"/>
+        <a:font script="Mong" typeface="Mongolian Baiti"/>
+        <a:font script="Viet" typeface="Times New Roman"/>
+        <a:font script="Uigh" typeface="Microsoft Uighur"/>
+        <a:font script="Geor" typeface="Sylfaen"/>
+      </a:majorFont>
+      <a:minorFont>
+        <a:latin typeface="Calibri"/>
+        <a:ea typeface=""/>
+        <a:cs typeface=""/>
+        <a:font script="Jpan" typeface="ＭＳ Ｐゴシック"/>
+        <a:font script="Hang" typeface="맑은 고딕"/>
+        <a:font script="Hans" typeface="宋体"/>
+        <a:font script="Hant" typeface="新細明體"/>
+        <a:font script="Arab" typeface="Arial"/>
+        <a:font script="Hebr" typeface="Arial"/>
+        <a:font script="Thai" typeface="Cordia New"/>
+        <a:font script="Ethi" typeface="Nyala"/>
+        <a:font script="Beng" typeface="Vrinda"/>
+        <a:font script="Gujr" typeface="Shruti"/>
+        <a:font script="Khmr" typeface="DaunPenh"/>
+        <a:font script="Knda" typeface="Tunga"/>
+        <a:font script="Guru" typeface="Raavi"/>
+        <a:font script="Cans" typeface="Euphemia"/>
+        <a:font script="Cher" typeface="Plantagenet Cherokee"/>
+        <a:font script="Yiii" typeface="Microsoft Yi Baiti"/>
+        <a:font script="Tibt" typeface="Microsoft Himalaya"/>
+        <a:font script="Thaa" typeface="MV Boli"/>
+        <a:font script="Deva" typeface="Mangal"/>
+        <a:font script="Telu" typeface="Gautami"/>
+        <a:font script="Taml" typeface="Latha"/>
+        <a:font script="Syrc" typeface="Estrangelo Edessa"/>
+        <a:font script="Orya" typeface="Kalinga"/>
+        <a:font script="Mlym" typeface="Kartika"/>
+        <a:font script="Laoo" typeface="DokChampa"/>
+        <a:font script="Sinh" typeface="Iskoola Pota"/>
+        <a:font script="Mong" typeface="Mongolian Baiti"/>
+        <a:font script="Viet" typeface="Arial"/>
+        <a:font script="Uigh" typeface="Microsoft Uighur"/>
+        <a:font script="Geor" typeface="Sylfaen"/>
+      </a:minorFont>
+    </a:fontScheme>
+    <a:fmtScheme name="Office">
+      <a:fillStyleLst>
+        <a:solidFill>
+          <a:schemeClr val="phClr"/>
+        </a:solidFill>
+        <a:gradFill rotWithShape="1">
+          <a:gsLst>
+            <a:gs pos="0">
+              <a:schemeClr val="phClr">
+                <a:tint val="50000"/>
+                <a:satMod val="300000"/>
+              </a:schemeClr>
+            </a:gs>
+            <a:gs pos="35000">
+              <a:schemeClr val="phClr">
+                <a:tint val="37000"/>
+                <a:satMod val="300000"/>
+              </a:schemeClr>
+            </a:gs>
+            <a:gs pos="100000">
+              <a:schemeClr val="phClr">
+                <a:tint val="15000"/>
+                <a:satMod val="350000"/>
+              </a:schemeClr>
+            </a:gs>
+          </a:gsLst>
+          <a:lin ang="16200000" scaled="1"/>
+        </a:gradFill>
+        <a:gradFill rotWithShape="1">
+          <a:gsLst>
+            <a:gs pos="0">
+              <a:schemeClr val="phClr">
+                <a:shade val="51000"/>
+                <a:satMod val="130000"/>
+              </a:schemeClr>
+            </a:gs>
+            <a:gs pos="80000">
+              <a:schemeClr val="phClr">
+                <a:shade val="93000"/>
+                <a:satMod val="130000"/>
+              </a:schemeClr>
+            </a:gs>
+            <a:gs pos="100000">
+              <a:schemeClr val="phClr">
+                <a:shade val="94000"/>
+                <a:satMod val="135000"/>
+              </a:schemeClr>
+            </a:gs>
+          </a:gsLst>
+          <a:lin ang="16200000" scaled="0"/>
+        </a:gradFill>
+      </a:fillStyleLst>
+      <a:lnStyleLst>
+        <a:ln w="9525" cap="flat" cmpd="sng" algn="ctr">
+          <a:solidFill>
+            <a:schemeClr val="phClr">
+              <a:shade val="95000"/>
+              <a:satMod val="105000"/>
+            </a:schemeClr>
+          </a:solidFill>
+          <a:prstDash val="solid"/>
+        </a:ln>
+        <a:ln w="25400" cap="flat" cmpd="sng" algn="ctr">
+          <a:solidFill>
+            <a:schemeClr val="phClr"/>
+          </a:solidFill>
+          <a:prstDash val="solid"/>
+        </a:ln>
+        <a:ln w="38100" cap="flat" cmpd="sng" algn="ctr">
+          <a:solidFill>
+            <a:schemeClr val="phClr"/>
+          </a:solidFill>
+          <a:prstDash val="solid"/>
+        </a:ln>
+      </a:lnStyleLst>
+      <a:effectStyleLst>
+        <a:effectStyle>
+          <a:effectLst>
+            <a:outerShdw blurRad="40000" dist="20000" dir="5400000" rotWithShape="0">
+              <a:srgbClr val="000000">
+                <a:alpha val="38000"/>
+              </a:srgbClr>
+            </a:outerShdw>
+          </a:effectLst>
+        </a:effectStyle>
+        <a:effectStyle>
+          <a:effectLst>
+            <a:outerShdw blurRad="40000" dist="23000" dir="5400000" rotWithShape="0">
+              <a:srgbClr val="000000">
+                <a:alpha val="35000"/>
+              </a:srgbClr>
+            </a:outerShdw>
+          </a:effectLst>
+        </a:effectStyle>
+        <a:effectStyle>
+          <a:effectLst>
+            <a:outerShdw blurRad="40000" dist="23000" dir="5400000" rotWithShape="0">
+              <a:srgbClr val="000000">
+                <a:alpha val="35000"/>
+              </a:srgbClr>
+            </a:outerShdw>
+          </a:effectLst>
+          <a:scene3d>
+            <a:camera prst="orthographicFront">
+              <a:rot lat="0" lon="0" rev="0"/>
+            </a:camera>
+            <a:lightRig rig="threePt" dir="t">
+              <a:rot lat="0" lon="0" rev="1200000"/>
+            </a:lightRig>
+          </a:scene3d>
+          <a:sp3d>
+            <a:bevelT w="63500" h="25400"/>
+          </a:sp3d>
+        </a:effectStyle>
+      </a:effectStyleLst>
+      <a:bgFillStyleLst>
+        <a:solidFill>
+          <a:schemeClr val="phClr"/>
+        </a:solidFill>
+        <a:gradFill rotWithShape="1">
+          <a:gsLst>
+            <a:gs pos="0">
+              <a:schemeClr val="phClr">
+                <a:tint val="40000"/>
+                <a:satMod val="350000"/>
+              </a:schemeClr>
+            </a:gs>
+            <a:gs pos="40000">
+              <a:schemeClr val="phClr">
+                <a:tint val="45000"/>
+                <a:shade val="99000"/>
+                <a:satMod val="350000"/>
+              </a:schemeClr>
+            </a:gs>
+            <a:gs pos="100000">
+              <a:schemeClr val="phClr">
+                <a:shade val="20000"/>
+                <a:satMod val="255000"/>
+              </a:schemeClr>
+            </a:gs>
+          </a:gsLst>
+          <a:path path="circle">
+            <a:fillToRect l="50000" t="-80000" r="50000" b="180000"/>
+          </a:path>
+        </a:gradFill>
+        <a:gradFill rotWithShape="1">
+          <a:gsLst>
+            <a:gs pos="0">
+              <a:schemeClr val="phClr">
+                <a:tint val="80000"/>
+                <a:satMod val="300000"/>
+              </a:schemeClr>
+            </a:gs>
+            <a:gs pos="100000">
+              <a:schemeClr val="phClr">
+                <a:shade val="30000"/>
+                <a:satMod val="200000"/>
+              </a:schemeClr>
+            </a:gs>
+          </a:gsLst>
+          <a:path path="circle">
+            <a:fillToRect l="50000" t="50000" r="50000" b="50000"/>
+          </a:path>
+        </a:gradFill>
+      </a:bgFillStyleLst>
+    </a:fmtScheme>
+  </a:themeElements>
+  <a:objectDefaults/>
+  <a:extraClrSchemeLst/>
+</a:theme>
 </file>
</xml_diff>